<commit_message>
correções de coesão no slide
</commit_message>
<xml_diff>
--- a/Módulo 10 - Componentes de formulários/Módulo X - Componentes de Formulários.pptx
+++ b/Módulo 10 - Componentes de formulários/Módulo X - Componentes de Formulários.pptx
@@ -355,7 +355,7 @@
             <a:fld id="{1D8BD707-D9CF-40AE-B4C6-C98DA3205C09}" type="datetimeFigureOut">
               <a:rPr lang="en-US" smtClean="0"/>
               <a:pPr/>
-              <a:t>12/3/2024</a:t>
+              <a:t>12/4/2024</a:t>
             </a:fld>
             <a:endParaRPr lang="en-US"/>
           </a:p>
@@ -520,7 +520,7 @@
             <a:fld id="{1D8BD707-D9CF-40AE-B4C6-C98DA3205C09}" type="datetimeFigureOut">
               <a:rPr lang="en-US" smtClean="0"/>
               <a:pPr/>
-              <a:t>12/3/2024</a:t>
+              <a:t>12/4/2024</a:t>
             </a:fld>
             <a:endParaRPr lang="en-US"/>
           </a:p>
@@ -695,7 +695,7 @@
             <a:fld id="{1D8BD707-D9CF-40AE-B4C6-C98DA3205C09}" type="datetimeFigureOut">
               <a:rPr lang="en-US" smtClean="0"/>
               <a:pPr/>
-              <a:t>12/3/2024</a:t>
+              <a:t>12/4/2024</a:t>
             </a:fld>
             <a:endParaRPr lang="en-US"/>
           </a:p>
@@ -860,7 +860,7 @@
             <a:fld id="{1D8BD707-D9CF-40AE-B4C6-C98DA3205C09}" type="datetimeFigureOut">
               <a:rPr lang="en-US" smtClean="0"/>
               <a:pPr/>
-              <a:t>12/3/2024</a:t>
+              <a:t>12/4/2024</a:t>
             </a:fld>
             <a:endParaRPr lang="en-US"/>
           </a:p>
@@ -1102,7 +1102,7 @@
             <a:fld id="{1D8BD707-D9CF-40AE-B4C6-C98DA3205C09}" type="datetimeFigureOut">
               <a:rPr lang="en-US" smtClean="0"/>
               <a:pPr/>
-              <a:t>12/3/2024</a:t>
+              <a:t>12/4/2024</a:t>
             </a:fld>
             <a:endParaRPr lang="en-US"/>
           </a:p>
@@ -1384,7 +1384,7 @@
             <a:fld id="{1D8BD707-D9CF-40AE-B4C6-C98DA3205C09}" type="datetimeFigureOut">
               <a:rPr lang="en-US" smtClean="0"/>
               <a:pPr/>
-              <a:t>12/3/2024</a:t>
+              <a:t>12/4/2024</a:t>
             </a:fld>
             <a:endParaRPr lang="en-US"/>
           </a:p>
@@ -1800,7 +1800,7 @@
             <a:fld id="{1D8BD707-D9CF-40AE-B4C6-C98DA3205C09}" type="datetimeFigureOut">
               <a:rPr lang="en-US" smtClean="0"/>
               <a:pPr/>
-              <a:t>12/3/2024</a:t>
+              <a:t>12/4/2024</a:t>
             </a:fld>
             <a:endParaRPr lang="en-US"/>
           </a:p>
@@ -1914,7 +1914,7 @@
             <a:fld id="{1D8BD707-D9CF-40AE-B4C6-C98DA3205C09}" type="datetimeFigureOut">
               <a:rPr lang="en-US" smtClean="0"/>
               <a:pPr/>
-              <a:t>12/3/2024</a:t>
+              <a:t>12/4/2024</a:t>
             </a:fld>
             <a:endParaRPr lang="en-US"/>
           </a:p>
@@ -2006,7 +2006,7 @@
             <a:fld id="{1D8BD707-D9CF-40AE-B4C6-C98DA3205C09}" type="datetimeFigureOut">
               <a:rPr lang="en-US" smtClean="0"/>
               <a:pPr/>
-              <a:t>12/3/2024</a:t>
+              <a:t>12/4/2024</a:t>
             </a:fld>
             <a:endParaRPr lang="en-US"/>
           </a:p>
@@ -2278,7 +2278,7 @@
             <a:fld id="{1D8BD707-D9CF-40AE-B4C6-C98DA3205C09}" type="datetimeFigureOut">
               <a:rPr lang="en-US" smtClean="0"/>
               <a:pPr/>
-              <a:t>12/3/2024</a:t>
+              <a:t>12/4/2024</a:t>
             </a:fld>
             <a:endParaRPr lang="en-US"/>
           </a:p>
@@ -2527,7 +2527,7 @@
             <a:fld id="{1D8BD707-D9CF-40AE-B4C6-C98DA3205C09}" type="datetimeFigureOut">
               <a:rPr lang="en-US" smtClean="0"/>
               <a:pPr/>
-              <a:t>12/3/2024</a:t>
+              <a:t>12/4/2024</a:t>
             </a:fld>
             <a:endParaRPr lang="en-US"/>
           </a:p>
@@ -2735,7 +2735,7 @@
             <a:fld id="{1D8BD707-D9CF-40AE-B4C6-C98DA3205C09}" type="datetimeFigureOut">
               <a:rPr lang="en-US" smtClean="0"/>
               <a:pPr/>
-              <a:t>12/3/2024</a:t>
+              <a:t>12/4/2024</a:t>
             </a:fld>
             <a:endParaRPr lang="en-US"/>
           </a:p>
@@ -3431,8 +3431,8 @@
         </p:nvSpPr>
         <p:spPr>
           <a:xfrm>
-            <a:off x="814372" y="4151353"/>
-            <a:ext cx="13335015" cy="1427314"/>
+            <a:off x="766088" y="3621928"/>
+            <a:ext cx="13335016" cy="3043141"/>
           </a:xfrm>
           <a:prstGeom prst="rect">
             <a:avLst/>
@@ -3550,7 +3550,7 @@
                 </a:solidFill>
                 <a:latin typeface="Poppins Bold"/>
               </a:rPr>
-              <a:t>Módulo </a:t>
+              <a:t>Módulo X</a:t>
             </a:r>
             <a:r>
               <a:rPr lang="pt-BR" sz="6000" spc="600" dirty="0">
@@ -3559,7 +3559,7 @@
                 </a:solidFill>
                 <a:latin typeface="Poppins Bold"/>
               </a:rPr>
-              <a:t>VIII - Formulários</a:t>
+              <a:t> – Componentes de Formulários</a:t>
             </a:r>
             <a:endParaRPr lang="pt-BR" sz="6000" spc="600" dirty="0">
               <a:solidFill>
@@ -4671,7 +4671,7 @@
                 <a:ea typeface="Lato" panose="020F0502020204030203" pitchFamily="34" charset="0"/>
                 <a:cs typeface="Lato" panose="020F0502020204030203" pitchFamily="34" charset="0"/>
               </a:rPr>
-              <a:t>fazemos</a:t>
+              <a:t>criamos</a:t>
             </a:r>
             <a:r>
               <a:rPr lang="en-US" sz="3000" spc="350" dirty="0">
@@ -4680,7 +4680,7 @@
                 <a:ea typeface="Lato" panose="020F0502020204030203" pitchFamily="34" charset="0"/>
                 <a:cs typeface="Lato" panose="020F0502020204030203" pitchFamily="34" charset="0"/>
               </a:rPr>
-              <a:t> o layout e </a:t>
+              <a:t> o layout, </a:t>
             </a:r>
             <a:r>
               <a:rPr lang="en-US" sz="3000" spc="350" dirty="0" err="1">
@@ -4689,7 +4689,7 @@
                 <a:ea typeface="Lato" panose="020F0502020204030203" pitchFamily="34" charset="0"/>
                 <a:cs typeface="Lato" panose="020F0502020204030203" pitchFamily="34" charset="0"/>
               </a:rPr>
-              <a:t>tornamo-os</a:t>
+              <a:t>desta</a:t>
             </a:r>
             <a:r>
               <a:rPr lang="en-US" sz="3000" spc="350" dirty="0">
@@ -4698,7 +4698,25 @@
                 <a:ea typeface="Lato" panose="020F0502020204030203" pitchFamily="34" charset="0"/>
                 <a:cs typeface="Lato" panose="020F0502020204030203" pitchFamily="34" charset="0"/>
               </a:rPr>
-              <a:t> </a:t>
+              <a:t> forma, </a:t>
+            </a:r>
+            <a:r>
+              <a:rPr lang="en-US" sz="3000" spc="350" dirty="0" err="1">
+                <a:effectLst/>
+                <a:latin typeface="Lato" panose="020F0502020204030203" pitchFamily="34" charset="0"/>
+                <a:ea typeface="Lato" panose="020F0502020204030203" pitchFamily="34" charset="0"/>
+                <a:cs typeface="Lato" panose="020F0502020204030203" pitchFamily="34" charset="0"/>
+              </a:rPr>
+              <a:t>torna</a:t>
+            </a:r>
+            <a:r>
+              <a:rPr lang="en-US" sz="3000" spc="350" dirty="0">
+                <a:effectLst/>
+                <a:latin typeface="Lato" panose="020F0502020204030203" pitchFamily="34" charset="0"/>
+                <a:ea typeface="Lato" panose="020F0502020204030203" pitchFamily="34" charset="0"/>
+                <a:cs typeface="Lato" panose="020F0502020204030203" pitchFamily="34" charset="0"/>
+              </a:rPr>
+              <a:t>-se </a:t>
             </a:r>
             <a:r>
               <a:rPr lang="en-US" sz="3000" spc="350" dirty="0" err="1">
@@ -5946,7 +5964,7 @@
         <p:spPr>
           <a:xfrm>
             <a:off x="816673" y="1687967"/>
-            <a:ext cx="16442627" cy="3204464"/>
+            <a:ext cx="16442627" cy="5890523"/>
           </a:xfrm>
           <a:prstGeom prst="rect">
             <a:avLst/>
@@ -6206,6 +6224,147 @@
               </a:rPr>
               <a:t>. 2024.</a:t>
             </a:r>
+          </a:p>
+          <a:p>
+            <a:pPr algn="just">
+              <a:lnSpc>
+                <a:spcPts val="4227"/>
+              </a:lnSpc>
+            </a:pPr>
+            <a:endParaRPr lang="en-US" sz="2799" spc="139" dirty="0">
+              <a:solidFill>
+                <a:srgbClr val="000000"/>
+              </a:solidFill>
+              <a:latin typeface="Poppins"/>
+            </a:endParaRPr>
+          </a:p>
+          <a:p>
+            <a:pPr algn="just">
+              <a:lnSpc>
+                <a:spcPts val="4227"/>
+              </a:lnSpc>
+            </a:pPr>
+            <a:r>
+              <a:rPr lang="en-US" sz="2799" spc="139" dirty="0">
+                <a:solidFill>
+                  <a:srgbClr val="000000"/>
+                </a:solidFill>
+                <a:latin typeface="Poppins Bold"/>
+              </a:rPr>
+              <a:t>An in-depth dive into implementing swipe-to-dismiss in Flutter.</a:t>
+            </a:r>
+            <a:r>
+              <a:rPr lang="en-US" sz="2799" spc="139" dirty="0">
+                <a:solidFill>
+                  <a:srgbClr val="000000"/>
+                </a:solidFill>
+                <a:latin typeface="Poppins"/>
+              </a:rPr>
+              <a:t> </a:t>
+            </a:r>
+            <a:r>
+              <a:rPr lang="en-US" sz="2799" spc="139" dirty="0" err="1">
+                <a:solidFill>
+                  <a:srgbClr val="000000"/>
+                </a:solidFill>
+                <a:latin typeface="Poppins"/>
+              </a:rPr>
+              <a:t>Disponível</a:t>
+            </a:r>
+            <a:r>
+              <a:rPr lang="en-US" sz="2799" spc="139" dirty="0">
+                <a:solidFill>
+                  <a:srgbClr val="000000"/>
+                </a:solidFill>
+                <a:latin typeface="Poppins"/>
+              </a:rPr>
+              <a:t> </a:t>
+            </a:r>
+            <a:r>
+              <a:rPr lang="en-US" sz="2799" spc="139" dirty="0" err="1">
+                <a:solidFill>
+                  <a:srgbClr val="000000"/>
+                </a:solidFill>
+                <a:latin typeface="Poppins"/>
+              </a:rPr>
+              <a:t>em</a:t>
+            </a:r>
+            <a:r>
+              <a:rPr lang="en-US" sz="2799" spc="139" dirty="0">
+                <a:solidFill>
+                  <a:srgbClr val="000000"/>
+                </a:solidFill>
+                <a:latin typeface="Poppins"/>
+              </a:rPr>
+              <a:t>: &lt;https://medium.com/flutter-community/an-in-depth-dive-into-implementing-swipe-to-dismiss-in-flutter-41b9007f1e0&gt;. </a:t>
+            </a:r>
+            <a:r>
+              <a:rPr lang="en-US" sz="2799" spc="139" dirty="0" err="1">
+                <a:solidFill>
+                  <a:srgbClr val="000000"/>
+                </a:solidFill>
+                <a:latin typeface="Poppins"/>
+              </a:rPr>
+              <a:t>Acesso</a:t>
+            </a:r>
+            <a:r>
+              <a:rPr lang="en-US" sz="2799" spc="139" dirty="0">
+                <a:solidFill>
+                  <a:srgbClr val="000000"/>
+                </a:solidFill>
+                <a:latin typeface="Poppins"/>
+              </a:rPr>
+              <a:t> </a:t>
+            </a:r>
+            <a:r>
+              <a:rPr lang="en-US" sz="2799" spc="139" dirty="0" err="1">
+                <a:solidFill>
+                  <a:srgbClr val="000000"/>
+                </a:solidFill>
+                <a:latin typeface="Poppins"/>
+              </a:rPr>
+              <a:t>em</a:t>
+            </a:r>
+            <a:r>
+              <a:rPr lang="en-US" sz="2799" spc="139" dirty="0">
+                <a:solidFill>
+                  <a:srgbClr val="000000"/>
+                </a:solidFill>
+                <a:latin typeface="Poppins"/>
+              </a:rPr>
+              <a:t>: 3 </a:t>
+            </a:r>
+            <a:r>
+              <a:rPr lang="en-US" sz="2799" spc="139" dirty="0" err="1">
+                <a:solidFill>
+                  <a:srgbClr val="000000"/>
+                </a:solidFill>
+                <a:latin typeface="Poppins"/>
+              </a:rPr>
+              <a:t>dez</a:t>
+            </a:r>
+            <a:r>
+              <a:rPr lang="en-US" sz="2799" spc="139" dirty="0">
+                <a:solidFill>
+                  <a:srgbClr val="000000"/>
+                </a:solidFill>
+                <a:latin typeface="Poppins"/>
+              </a:rPr>
+              <a:t>. 2024.</a:t>
+            </a:r>
+          </a:p>
+          <a:p>
+            <a:pPr algn="just">
+              <a:lnSpc>
+                <a:spcPts val="4227"/>
+              </a:lnSpc>
+            </a:pPr>
+            <a:endParaRPr lang="en-US" sz="2799" spc="139" dirty="0">
+              <a:solidFill>
+                <a:srgbClr val="000000"/>
+              </a:solidFill>
+              <a:latin typeface="Poppins"/>
+            </a:endParaRPr>
           </a:p>
         </p:txBody>
       </p:sp>

</xml_diff>